<commit_message>
Add the basic type in interview
</commit_message>
<xml_diff>
--- a/JavaInterview/Java_interview.pptx
+++ b/JavaInterview/Java_interview.pptx
@@ -9,6 +9,7 @@
     <p:sldId id="257" r:id="rId3"/>
     <p:sldId id="258" r:id="rId4"/>
     <p:sldId id="259" r:id="rId5"/>
+    <p:sldId id="260" r:id="rId6"/>
   </p:sldIdLst>
   <p:sldSz cx="12192000" cy="6858000"/>
   <p:notesSz cx="6858000" cy="9144000"/>
@@ -107,6 +108,11 @@
       </a:defRPr>
     </a:lvl9pPr>
   </p:defaultTextStyle>
+  <p:extLst>
+    <p:ext uri="{EFAFB233-063F-42B5-8137-9DF3F51BA10A}">
+      <p15:sldGuideLst xmlns:p15="http://schemas.microsoft.com/office/powerpoint/2012/main"/>
+    </p:ext>
+  </p:extLst>
 </p:presentation>
 </file>
 
@@ -257,7 +263,7 @@
           <a:p>
             <a:fld id="{39790004-AB0F-4813-8C83-9BB57BC55FB1}" type="datetimeFigureOut">
               <a:rPr lang="zh-TW" altLang="en-US" smtClean="0"/>
-              <a:t>2023/10/21</a:t>
+              <a:t>2023/10/25</a:t>
             </a:fld>
             <a:endParaRPr lang="zh-TW" altLang="en-US"/>
           </a:p>
@@ -455,7 +461,7 @@
           <a:p>
             <a:fld id="{39790004-AB0F-4813-8C83-9BB57BC55FB1}" type="datetimeFigureOut">
               <a:rPr lang="zh-TW" altLang="en-US" smtClean="0"/>
-              <a:t>2023/10/21</a:t>
+              <a:t>2023/10/25</a:t>
             </a:fld>
             <a:endParaRPr lang="zh-TW" altLang="en-US"/>
           </a:p>
@@ -663,7 +669,7 @@
           <a:p>
             <a:fld id="{39790004-AB0F-4813-8C83-9BB57BC55FB1}" type="datetimeFigureOut">
               <a:rPr lang="zh-TW" altLang="en-US" smtClean="0"/>
-              <a:t>2023/10/21</a:t>
+              <a:t>2023/10/25</a:t>
             </a:fld>
             <a:endParaRPr lang="zh-TW" altLang="en-US"/>
           </a:p>
@@ -861,7 +867,7 @@
           <a:p>
             <a:fld id="{39790004-AB0F-4813-8C83-9BB57BC55FB1}" type="datetimeFigureOut">
               <a:rPr lang="zh-TW" altLang="en-US" smtClean="0"/>
-              <a:t>2023/10/21</a:t>
+              <a:t>2023/10/25</a:t>
             </a:fld>
             <a:endParaRPr lang="zh-TW" altLang="en-US"/>
           </a:p>
@@ -1136,7 +1142,7 @@
           <a:p>
             <a:fld id="{39790004-AB0F-4813-8C83-9BB57BC55FB1}" type="datetimeFigureOut">
               <a:rPr lang="zh-TW" altLang="en-US" smtClean="0"/>
-              <a:t>2023/10/21</a:t>
+              <a:t>2023/10/25</a:t>
             </a:fld>
             <a:endParaRPr lang="zh-TW" altLang="en-US"/>
           </a:p>
@@ -1401,7 +1407,7 @@
           <a:p>
             <a:fld id="{39790004-AB0F-4813-8C83-9BB57BC55FB1}" type="datetimeFigureOut">
               <a:rPr lang="zh-TW" altLang="en-US" smtClean="0"/>
-              <a:t>2023/10/21</a:t>
+              <a:t>2023/10/25</a:t>
             </a:fld>
             <a:endParaRPr lang="zh-TW" altLang="en-US"/>
           </a:p>
@@ -1813,7 +1819,7 @@
           <a:p>
             <a:fld id="{39790004-AB0F-4813-8C83-9BB57BC55FB1}" type="datetimeFigureOut">
               <a:rPr lang="zh-TW" altLang="en-US" smtClean="0"/>
-              <a:t>2023/10/21</a:t>
+              <a:t>2023/10/25</a:t>
             </a:fld>
             <a:endParaRPr lang="zh-TW" altLang="en-US"/>
           </a:p>
@@ -1954,7 +1960,7 @@
           <a:p>
             <a:fld id="{39790004-AB0F-4813-8C83-9BB57BC55FB1}" type="datetimeFigureOut">
               <a:rPr lang="zh-TW" altLang="en-US" smtClean="0"/>
-              <a:t>2023/10/21</a:t>
+              <a:t>2023/10/25</a:t>
             </a:fld>
             <a:endParaRPr lang="zh-TW" altLang="en-US"/>
           </a:p>
@@ -2067,7 +2073,7 @@
           <a:p>
             <a:fld id="{39790004-AB0F-4813-8C83-9BB57BC55FB1}" type="datetimeFigureOut">
               <a:rPr lang="zh-TW" altLang="en-US" smtClean="0"/>
-              <a:t>2023/10/21</a:t>
+              <a:t>2023/10/25</a:t>
             </a:fld>
             <a:endParaRPr lang="zh-TW" altLang="en-US"/>
           </a:p>
@@ -2378,7 +2384,7 @@
           <a:p>
             <a:fld id="{39790004-AB0F-4813-8C83-9BB57BC55FB1}" type="datetimeFigureOut">
               <a:rPr lang="zh-TW" altLang="en-US" smtClean="0"/>
-              <a:t>2023/10/21</a:t>
+              <a:t>2023/10/25</a:t>
             </a:fld>
             <a:endParaRPr lang="zh-TW" altLang="en-US"/>
           </a:p>
@@ -2666,7 +2672,7 @@
           <a:p>
             <a:fld id="{39790004-AB0F-4813-8C83-9BB57BC55FB1}" type="datetimeFigureOut">
               <a:rPr lang="zh-TW" altLang="en-US" smtClean="0"/>
-              <a:t>2023/10/21</a:t>
+              <a:t>2023/10/25</a:t>
             </a:fld>
             <a:endParaRPr lang="zh-TW" altLang="en-US"/>
           </a:p>
@@ -2907,7 +2913,7 @@
           <a:p>
             <a:fld id="{39790004-AB0F-4813-8C83-9BB57BC55FB1}" type="datetimeFigureOut">
               <a:rPr lang="zh-TW" altLang="en-US" smtClean="0"/>
-              <a:t>2023/10/21</a:t>
+              <a:t>2023/10/25</a:t>
             </a:fld>
             <a:endParaRPr lang="zh-TW" altLang="en-US"/>
           </a:p>
@@ -4019,6 +4025,126 @@
 </p:sld>
 </file>
 
+<file path=ppt/slides/slide5.xml><?xml version="1.0" encoding="utf-8"?>
+<p:sld xmlns:a="http://schemas.openxmlformats.org/drawingml/2006/main" xmlns:r="http://schemas.openxmlformats.org/officeDocument/2006/relationships" xmlns:p="http://schemas.openxmlformats.org/presentationml/2006/main">
+  <p:cSld>
+    <p:spTree>
+      <p:nvGrpSpPr>
+        <p:cNvPr id="1" name=""/>
+        <p:cNvGrpSpPr/>
+        <p:nvPr/>
+      </p:nvGrpSpPr>
+      <p:grpSpPr>
+        <a:xfrm>
+          <a:off x="0" y="0"/>
+          <a:ext cx="0" cy="0"/>
+          <a:chOff x="0" y="0"/>
+          <a:chExt cx="0" cy="0"/>
+        </a:xfrm>
+      </p:grpSpPr>
+      <p:sp>
+        <p:nvSpPr>
+          <p:cNvPr id="4" name="文本框 3"/>
+          <p:cNvSpPr txBox="1"/>
+          <p:nvPr/>
+        </p:nvSpPr>
+        <p:spPr>
+          <a:xfrm>
+            <a:off x="195308" y="213064"/>
+            <a:ext cx="1569660" cy="369332"/>
+          </a:xfrm>
+          <a:prstGeom prst="rect">
+            <a:avLst/>
+          </a:prstGeom>
+          <a:noFill/>
+        </p:spPr>
+        <p:txBody>
+          <a:bodyPr wrap="none" rtlCol="0">
+            <a:spAutoFit/>
+          </a:bodyPr>
+          <a:lstStyle/>
+          <a:p>
+            <a:r>
+              <a:rPr lang="zh-CN" altLang="en-US" b="1" dirty="0" smtClean="0"/>
+              <a:t>基本数据类型</a:t>
+            </a:r>
+            <a:endParaRPr lang="zh-CN" altLang="en-US" b="1" dirty="0"/>
+          </a:p>
+        </p:txBody>
+      </p:sp>
+      <p:pic>
+        <p:nvPicPr>
+          <p:cNvPr id="5" name="图片 4"/>
+          <p:cNvPicPr>
+            <a:picLocks noChangeAspect="1"/>
+          </p:cNvPicPr>
+          <p:nvPr/>
+        </p:nvPicPr>
+        <p:blipFill>
+          <a:blip r:embed="rId2">
+            <a:extLst>
+              <a:ext uri="{28A0092B-C50C-407E-A947-70E740481C1C}">
+                <a14:useLocalDpi xmlns:a14="http://schemas.microsoft.com/office/drawing/2010/main" val="0"/>
+              </a:ext>
+            </a:extLst>
+          </a:blip>
+          <a:stretch>
+            <a:fillRect/>
+          </a:stretch>
+        </p:blipFill>
+        <p:spPr>
+          <a:xfrm>
+            <a:off x="1891431" y="-110062"/>
+            <a:ext cx="8517698" cy="3801714"/>
+          </a:xfrm>
+          <a:prstGeom prst="rect">
+            <a:avLst/>
+          </a:prstGeom>
+        </p:spPr>
+      </p:pic>
+      <p:pic>
+        <p:nvPicPr>
+          <p:cNvPr id="6" name="图片 5"/>
+          <p:cNvPicPr>
+            <a:picLocks noChangeAspect="1"/>
+          </p:cNvPicPr>
+          <p:nvPr/>
+        </p:nvPicPr>
+        <p:blipFill>
+          <a:blip r:embed="rId3">
+            <a:extLst>
+              <a:ext uri="{28A0092B-C50C-407E-A947-70E740481C1C}">
+                <a14:useLocalDpi xmlns:a14="http://schemas.microsoft.com/office/drawing/2010/main" val="0"/>
+              </a:ext>
+            </a:extLst>
+          </a:blip>
+          <a:stretch>
+            <a:fillRect/>
+          </a:stretch>
+        </p:blipFill>
+        <p:spPr>
+          <a:xfrm>
+            <a:off x="2064327" y="3601208"/>
+            <a:ext cx="7887820" cy="3059519"/>
+          </a:xfrm>
+          <a:prstGeom prst="rect">
+            <a:avLst/>
+          </a:prstGeom>
+        </p:spPr>
+      </p:pic>
+    </p:spTree>
+    <p:extLst>
+      <p:ext uri="{BB962C8B-B14F-4D97-AF65-F5344CB8AC3E}">
+        <p14:creationId xmlns:p14="http://schemas.microsoft.com/office/powerpoint/2010/main" val="3973765533"/>
+      </p:ext>
+    </p:extLst>
+  </p:cSld>
+  <p:clrMapOvr>
+    <a:masterClrMapping/>
+  </p:clrMapOvr>
+</p:sld>
+</file>
+
 <file path=ppt/theme/theme1.xml><?xml version="1.0" encoding="utf-8"?>
 <a:theme xmlns:a="http://schemas.openxmlformats.org/drawingml/2006/main" name="Office 佈景主題">
   <a:themeElements>

</xml_diff>

<commit_message>
Add more content in Java Interview Study
</commit_message>
<xml_diff>
--- a/JavaInterview/Java_interview.pptx
+++ b/JavaInterview/Java_interview.pptx
@@ -10,6 +10,7 @@
     <p:sldId id="258" r:id="rId4"/>
     <p:sldId id="259" r:id="rId5"/>
     <p:sldId id="260" r:id="rId6"/>
+    <p:sldId id="261" r:id="rId7"/>
   </p:sldIdLst>
   <p:sldSz cx="12192000" cy="6858000"/>
   <p:notesSz cx="6858000" cy="9144000"/>
@@ -263,7 +264,7 @@
           <a:p>
             <a:fld id="{39790004-AB0F-4813-8C83-9BB57BC55FB1}" type="datetimeFigureOut">
               <a:rPr lang="zh-TW" altLang="en-US" smtClean="0"/>
-              <a:t>2023/10/25</a:t>
+              <a:t>2023/11/9</a:t>
             </a:fld>
             <a:endParaRPr lang="zh-TW" altLang="en-US"/>
           </a:p>
@@ -461,7 +462,7 @@
           <a:p>
             <a:fld id="{39790004-AB0F-4813-8C83-9BB57BC55FB1}" type="datetimeFigureOut">
               <a:rPr lang="zh-TW" altLang="en-US" smtClean="0"/>
-              <a:t>2023/10/25</a:t>
+              <a:t>2023/11/9</a:t>
             </a:fld>
             <a:endParaRPr lang="zh-TW" altLang="en-US"/>
           </a:p>
@@ -669,7 +670,7 @@
           <a:p>
             <a:fld id="{39790004-AB0F-4813-8C83-9BB57BC55FB1}" type="datetimeFigureOut">
               <a:rPr lang="zh-TW" altLang="en-US" smtClean="0"/>
-              <a:t>2023/10/25</a:t>
+              <a:t>2023/11/9</a:t>
             </a:fld>
             <a:endParaRPr lang="zh-TW" altLang="en-US"/>
           </a:p>
@@ -867,7 +868,7 @@
           <a:p>
             <a:fld id="{39790004-AB0F-4813-8C83-9BB57BC55FB1}" type="datetimeFigureOut">
               <a:rPr lang="zh-TW" altLang="en-US" smtClean="0"/>
-              <a:t>2023/10/25</a:t>
+              <a:t>2023/11/9</a:t>
             </a:fld>
             <a:endParaRPr lang="zh-TW" altLang="en-US"/>
           </a:p>
@@ -1142,7 +1143,7 @@
           <a:p>
             <a:fld id="{39790004-AB0F-4813-8C83-9BB57BC55FB1}" type="datetimeFigureOut">
               <a:rPr lang="zh-TW" altLang="en-US" smtClean="0"/>
-              <a:t>2023/10/25</a:t>
+              <a:t>2023/11/9</a:t>
             </a:fld>
             <a:endParaRPr lang="zh-TW" altLang="en-US"/>
           </a:p>
@@ -1407,7 +1408,7 @@
           <a:p>
             <a:fld id="{39790004-AB0F-4813-8C83-9BB57BC55FB1}" type="datetimeFigureOut">
               <a:rPr lang="zh-TW" altLang="en-US" smtClean="0"/>
-              <a:t>2023/10/25</a:t>
+              <a:t>2023/11/9</a:t>
             </a:fld>
             <a:endParaRPr lang="zh-TW" altLang="en-US"/>
           </a:p>
@@ -1819,7 +1820,7 @@
           <a:p>
             <a:fld id="{39790004-AB0F-4813-8C83-9BB57BC55FB1}" type="datetimeFigureOut">
               <a:rPr lang="zh-TW" altLang="en-US" smtClean="0"/>
-              <a:t>2023/10/25</a:t>
+              <a:t>2023/11/9</a:t>
             </a:fld>
             <a:endParaRPr lang="zh-TW" altLang="en-US"/>
           </a:p>
@@ -1960,7 +1961,7 @@
           <a:p>
             <a:fld id="{39790004-AB0F-4813-8C83-9BB57BC55FB1}" type="datetimeFigureOut">
               <a:rPr lang="zh-TW" altLang="en-US" smtClean="0"/>
-              <a:t>2023/10/25</a:t>
+              <a:t>2023/11/9</a:t>
             </a:fld>
             <a:endParaRPr lang="zh-TW" altLang="en-US"/>
           </a:p>
@@ -2073,7 +2074,7 @@
           <a:p>
             <a:fld id="{39790004-AB0F-4813-8C83-9BB57BC55FB1}" type="datetimeFigureOut">
               <a:rPr lang="zh-TW" altLang="en-US" smtClean="0"/>
-              <a:t>2023/10/25</a:t>
+              <a:t>2023/11/9</a:t>
             </a:fld>
             <a:endParaRPr lang="zh-TW" altLang="en-US"/>
           </a:p>
@@ -2384,7 +2385,7 @@
           <a:p>
             <a:fld id="{39790004-AB0F-4813-8C83-9BB57BC55FB1}" type="datetimeFigureOut">
               <a:rPr lang="zh-TW" altLang="en-US" smtClean="0"/>
-              <a:t>2023/10/25</a:t>
+              <a:t>2023/11/9</a:t>
             </a:fld>
             <a:endParaRPr lang="zh-TW" altLang="en-US"/>
           </a:p>
@@ -2672,7 +2673,7 @@
           <a:p>
             <a:fld id="{39790004-AB0F-4813-8C83-9BB57BC55FB1}" type="datetimeFigureOut">
               <a:rPr lang="zh-TW" altLang="en-US" smtClean="0"/>
-              <a:t>2023/10/25</a:t>
+              <a:t>2023/11/9</a:t>
             </a:fld>
             <a:endParaRPr lang="zh-TW" altLang="en-US"/>
           </a:p>
@@ -2913,7 +2914,7 @@
           <a:p>
             <a:fld id="{39790004-AB0F-4813-8C83-9BB57BC55FB1}" type="datetimeFigureOut">
               <a:rPr lang="zh-TW" altLang="en-US" smtClean="0"/>
-              <a:t>2023/10/25</a:t>
+              <a:t>2023/11/9</a:t>
             </a:fld>
             <a:endParaRPr lang="zh-TW" altLang="en-US"/>
           </a:p>
@@ -3418,8 +3419,8 @@
           <a:lstStyle/>
           <a:p>
             <a:r>
-              <a:rPr lang="en-US" altLang="zh-TW" b="1" dirty="0"/>
-              <a:t>JVM</a:t>
+              <a:rPr lang="en-US" altLang="zh-TW" b="1" dirty="0" smtClean="0"/>
+              <a:t>1. JVM</a:t>
             </a:r>
             <a:r>
               <a:rPr lang="zh-TW" altLang="en-US" b="1" dirty="0"/>
@@ -3719,7 +3720,7 @@
         <p:spPr>
           <a:xfrm>
             <a:off x="121920" y="223520"/>
-            <a:ext cx="3506088" cy="369332"/>
+            <a:ext cx="3735318" cy="369332"/>
           </a:xfrm>
           <a:prstGeom prst="rect">
             <a:avLst/>
@@ -3733,8 +3734,16 @@
           <a:lstStyle/>
           <a:p>
             <a:r>
+              <a:rPr lang="en-US" altLang="zh-CN" b="1" dirty="0" smtClean="0"/>
+              <a:t>2, </a:t>
+            </a:r>
+            <a:r>
+              <a:rPr lang="zh-CN" altLang="en-US" b="1" dirty="0" smtClean="0"/>
+              <a:t>什</a:t>
+            </a:r>
+            <a:r>
               <a:rPr lang="zh-CN" altLang="en-US" b="1" dirty="0"/>
-              <a:t>什麽是字節碼</a:t>
+              <a:t>麽是字節碼</a:t>
             </a:r>
             <a:r>
               <a:rPr lang="en-US" altLang="zh-CN" b="1" dirty="0"/>
@@ -3954,8 +3963,16 @@
           <a:lstStyle/>
           <a:p>
             <a:r>
+              <a:rPr lang="en-US" altLang="zh-CN" b="1" dirty="0" smtClean="0"/>
+              <a:t>3.</a:t>
+            </a:r>
+            <a:r>
+              <a:rPr lang="zh-CN" altLang="en-US" b="1" dirty="0" smtClean="0"/>
+              <a:t>采用</a:t>
+            </a:r>
+            <a:r>
               <a:rPr lang="zh-CN" altLang="en-US" b="1" dirty="0"/>
-              <a:t>采用字節碼的好處</a:t>
+              <a:t>字節碼的好處</a:t>
             </a:r>
             <a:r>
               <a:rPr lang="en-US" altLang="zh-CN" b="1" dirty="0"/>
@@ -4051,7 +4068,7 @@
         <p:spPr>
           <a:xfrm>
             <a:off x="195308" y="213064"/>
-            <a:ext cx="1569660" cy="369332"/>
+            <a:ext cx="1800493" cy="369332"/>
           </a:xfrm>
           <a:prstGeom prst="rect">
             <a:avLst/>
@@ -4065,8 +4082,16 @@
           <a:lstStyle/>
           <a:p>
             <a:r>
+              <a:rPr lang="en-US" altLang="zh-CN" b="1" dirty="0" smtClean="0"/>
+              <a:t>4. </a:t>
+            </a:r>
+            <a:r>
               <a:rPr lang="zh-CN" altLang="en-US" b="1" dirty="0" smtClean="0"/>
-              <a:t>基本数据类型</a:t>
+              <a:t>基本</a:t>
+            </a:r>
+            <a:r>
+              <a:rPr lang="zh-CN" altLang="en-US" b="1" dirty="0" smtClean="0"/>
+              <a:t>数据类型</a:t>
             </a:r>
             <a:endParaRPr lang="zh-CN" altLang="en-US" b="1" dirty="0"/>
           </a:p>
@@ -4136,6 +4161,780 @@
     <p:extLst>
       <p:ext uri="{BB962C8B-B14F-4D97-AF65-F5344CB8AC3E}">
         <p14:creationId xmlns:p14="http://schemas.microsoft.com/office/powerpoint/2010/main" val="3973765533"/>
+      </p:ext>
+    </p:extLst>
+  </p:cSld>
+  <p:clrMapOvr>
+    <a:masterClrMapping/>
+  </p:clrMapOvr>
+</p:sld>
+</file>
+
+<file path=ppt/slides/slide6.xml><?xml version="1.0" encoding="utf-8"?>
+<p:sld xmlns:a="http://schemas.openxmlformats.org/drawingml/2006/main" xmlns:r="http://schemas.openxmlformats.org/officeDocument/2006/relationships" xmlns:p="http://schemas.openxmlformats.org/presentationml/2006/main">
+  <p:cSld>
+    <p:spTree>
+      <p:nvGrpSpPr>
+        <p:cNvPr id="1" name=""/>
+        <p:cNvGrpSpPr/>
+        <p:nvPr/>
+      </p:nvGrpSpPr>
+      <p:grpSpPr>
+        <a:xfrm>
+          <a:off x="0" y="0"/>
+          <a:ext cx="0" cy="0"/>
+          <a:chOff x="0" y="0"/>
+          <a:chExt cx="0" cy="0"/>
+        </a:xfrm>
+      </p:grpSpPr>
+      <p:sp>
+        <p:nvSpPr>
+          <p:cNvPr id="6" name="文本框 5"/>
+          <p:cNvSpPr txBox="1"/>
+          <p:nvPr/>
+        </p:nvSpPr>
+        <p:spPr>
+          <a:xfrm>
+            <a:off x="204185" y="142043"/>
+            <a:ext cx="10813003" cy="792525"/>
+          </a:xfrm>
+          <a:prstGeom prst="rect">
+            <a:avLst/>
+          </a:prstGeom>
+          <a:noFill/>
+        </p:spPr>
+        <p:txBody>
+          <a:bodyPr wrap="square" rtlCol="0">
+            <a:spAutoFit/>
+          </a:bodyPr>
+          <a:lstStyle/>
+          <a:p>
+            <a:r>
+              <a:rPr lang="en-US" altLang="zh-CN" sz="1400" b="1" dirty="0"/>
+              <a:t>5</a:t>
+            </a:r>
+            <a:r>
+              <a:rPr lang="en-US" altLang="zh-CN" sz="1400" b="1" dirty="0" smtClean="0"/>
+              <a:t>.switch </a:t>
+            </a:r>
+            <a:r>
+              <a:rPr lang="zh-CN" altLang="en-US" sz="1400" b="1" dirty="0"/>
+              <a:t>是否能作用在 </a:t>
+            </a:r>
+            <a:r>
+              <a:rPr lang="en-US" altLang="zh-CN" sz="1400" b="1" dirty="0"/>
+              <a:t>byte </a:t>
+            </a:r>
+            <a:r>
+              <a:rPr lang="zh-CN" altLang="en-US" sz="1400" b="1" dirty="0"/>
+              <a:t>上，是否能作用在 </a:t>
+            </a:r>
+            <a:r>
+              <a:rPr lang="en-US" altLang="zh-CN" sz="1400" b="1" dirty="0"/>
+              <a:t>long </a:t>
+            </a:r>
+            <a:r>
+              <a:rPr lang="zh-CN" altLang="en-US" sz="1400" b="1" dirty="0"/>
+              <a:t>上，是否能作用在 </a:t>
+            </a:r>
+            <a:r>
+              <a:rPr lang="en-US" altLang="zh-CN" sz="1400" b="1" dirty="0"/>
+              <a:t>String </a:t>
+            </a:r>
+            <a:r>
+              <a:rPr lang="zh-CN" altLang="en-US" sz="1400" b="1" dirty="0"/>
+              <a:t>上</a:t>
+            </a:r>
+            <a:r>
+              <a:rPr lang="zh-CN" altLang="en-US" sz="1400" b="1" dirty="0" smtClean="0"/>
+              <a:t>？</a:t>
+            </a:r>
+            <a:endParaRPr lang="en-US" altLang="zh-CN" sz="1400" b="1" dirty="0" smtClean="0"/>
+          </a:p>
+          <a:p>
+            <a:r>
+              <a:rPr lang="en-US" altLang="zh-CN" sz="1050" dirty="0"/>
+              <a:t> </a:t>
+            </a:r>
+            <a:r>
+              <a:rPr lang="en-US" altLang="zh-CN" sz="1050" dirty="0" smtClean="0"/>
+              <a:t>              Java5 </a:t>
+            </a:r>
+            <a:r>
+              <a:rPr lang="zh-CN" altLang="en-US" sz="1050" dirty="0"/>
+              <a:t>以前 </a:t>
+            </a:r>
+            <a:r>
+              <a:rPr lang="en-US" altLang="zh-CN" sz="1050" dirty="0"/>
+              <a:t>switch(expr)</a:t>
+            </a:r>
+            <a:r>
+              <a:rPr lang="zh-CN" altLang="en-US" sz="1050" dirty="0"/>
+              <a:t>中，</a:t>
+            </a:r>
+            <a:r>
+              <a:rPr lang="en-US" altLang="zh-CN" sz="1050" dirty="0"/>
+              <a:t>expr </a:t>
+            </a:r>
+            <a:r>
+              <a:rPr lang="zh-CN" altLang="en-US" sz="1050" dirty="0"/>
+              <a:t>只能是 </a:t>
+            </a:r>
+            <a:r>
+              <a:rPr lang="en-US" altLang="zh-CN" sz="1050" dirty="0"/>
+              <a:t>byte</a:t>
+            </a:r>
+            <a:r>
+              <a:rPr lang="zh-CN" altLang="en-US" sz="1050" dirty="0"/>
+              <a:t>、</a:t>
+            </a:r>
+            <a:r>
+              <a:rPr lang="en-US" altLang="zh-CN" sz="1050" dirty="0"/>
+              <a:t>short</a:t>
+            </a:r>
+            <a:r>
+              <a:rPr lang="zh-CN" altLang="en-US" sz="1050" dirty="0"/>
+              <a:t>、</a:t>
+            </a:r>
+            <a:r>
+              <a:rPr lang="en-US" altLang="zh-CN" sz="1050" dirty="0"/>
+              <a:t>char</a:t>
+            </a:r>
+            <a:r>
+              <a:rPr lang="zh-CN" altLang="en-US" sz="1050" dirty="0"/>
+              <a:t>、</a:t>
+            </a:r>
+            <a:r>
+              <a:rPr lang="en-US" altLang="zh-CN" sz="1050" dirty="0" err="1"/>
+              <a:t>int</a:t>
+            </a:r>
+            <a:r>
+              <a:rPr lang="zh-CN" altLang="en-US" sz="1050" dirty="0" smtClean="0"/>
+              <a:t>。</a:t>
+            </a:r>
+            <a:endParaRPr lang="en-US" altLang="zh-CN" sz="1050" dirty="0" smtClean="0"/>
+          </a:p>
+          <a:p>
+            <a:pPr lvl="1"/>
+            <a:r>
+              <a:rPr lang="zh-CN" altLang="en-US" sz="1050" dirty="0" smtClean="0"/>
+              <a:t>从 </a:t>
+            </a:r>
+            <a:r>
+              <a:rPr lang="en-US" altLang="zh-CN" sz="1050" dirty="0"/>
+              <a:t>Java 5 </a:t>
+            </a:r>
+            <a:r>
+              <a:rPr lang="zh-CN" altLang="en-US" sz="1050" dirty="0"/>
+              <a:t>开始，</a:t>
+            </a:r>
+            <a:r>
+              <a:rPr lang="en-US" altLang="zh-CN" sz="1050" dirty="0"/>
+              <a:t>Java </a:t>
+            </a:r>
+            <a:r>
+              <a:rPr lang="zh-CN" altLang="en-US" sz="1050" dirty="0"/>
+              <a:t>中引入了枚举类型， </a:t>
+            </a:r>
+            <a:r>
+              <a:rPr lang="en-US" altLang="zh-CN" sz="1050" dirty="0"/>
+              <a:t>expr </a:t>
+            </a:r>
+            <a:r>
+              <a:rPr lang="zh-CN" altLang="en-US" sz="1050" dirty="0"/>
+              <a:t>也可以是 </a:t>
+            </a:r>
+            <a:r>
+              <a:rPr lang="en-US" altLang="zh-CN" sz="1050" dirty="0" err="1"/>
+              <a:t>enum</a:t>
+            </a:r>
+            <a:r>
+              <a:rPr lang="en-US" altLang="zh-CN" sz="1050" dirty="0"/>
+              <a:t> </a:t>
+            </a:r>
+            <a:r>
+              <a:rPr lang="zh-CN" altLang="en-US" sz="1050" dirty="0"/>
+              <a:t>类型</a:t>
+            </a:r>
+            <a:r>
+              <a:rPr lang="zh-CN" altLang="en-US" sz="1050" dirty="0" smtClean="0"/>
+              <a:t>。</a:t>
+            </a:r>
+            <a:endParaRPr lang="en-US" altLang="zh-CN" sz="1050" dirty="0" smtClean="0"/>
+          </a:p>
+          <a:p>
+            <a:pPr lvl="1"/>
+            <a:r>
+              <a:rPr lang="zh-CN" altLang="en-US" sz="1050" dirty="0" smtClean="0"/>
+              <a:t>从 </a:t>
+            </a:r>
+            <a:r>
+              <a:rPr lang="en-US" altLang="zh-CN" sz="1050" dirty="0"/>
+              <a:t>Java 7 </a:t>
+            </a:r>
+            <a:r>
+              <a:rPr lang="zh-CN" altLang="en-US" sz="1050" dirty="0"/>
+              <a:t>开始，</a:t>
+            </a:r>
+            <a:r>
+              <a:rPr lang="en-US" altLang="zh-CN" sz="1050" dirty="0"/>
+              <a:t>expr</a:t>
+            </a:r>
+            <a:r>
+              <a:rPr lang="zh-CN" altLang="en-US" sz="1050" dirty="0"/>
+              <a:t>还可以是字符串</a:t>
+            </a:r>
+            <a:r>
+              <a:rPr lang="en-US" altLang="zh-CN" sz="1050" dirty="0"/>
+              <a:t>(String)</a:t>
+            </a:r>
+            <a:r>
+              <a:rPr lang="zh-CN" altLang="en-US" sz="1050" dirty="0"/>
+              <a:t>，但是长整型</a:t>
+            </a:r>
+            <a:r>
+              <a:rPr lang="en-US" altLang="zh-CN" sz="1050" dirty="0"/>
+              <a:t>(long)</a:t>
+            </a:r>
+            <a:r>
+              <a:rPr lang="zh-CN" altLang="en-US" sz="1050" dirty="0"/>
+              <a:t>在目前所有的版本中都是不可以</a:t>
+            </a:r>
+            <a:r>
+              <a:rPr lang="zh-CN" altLang="en-US" sz="1050" dirty="0" smtClean="0"/>
+              <a:t>的</a:t>
+            </a:r>
+            <a:endParaRPr lang="zh-CN" altLang="en-US" sz="1050" dirty="0"/>
+          </a:p>
+        </p:txBody>
+      </p:sp>
+      <p:sp>
+        <p:nvSpPr>
+          <p:cNvPr id="9" name="文本框 8"/>
+          <p:cNvSpPr txBox="1"/>
+          <p:nvPr/>
+        </p:nvSpPr>
+        <p:spPr>
+          <a:xfrm>
+            <a:off x="133164" y="1333426"/>
+            <a:ext cx="6601487" cy="1077218"/>
+          </a:xfrm>
+          <a:prstGeom prst="rect">
+            <a:avLst/>
+          </a:prstGeom>
+          <a:noFill/>
+        </p:spPr>
+        <p:txBody>
+          <a:bodyPr wrap="none" rtlCol="0">
+            <a:spAutoFit/>
+          </a:bodyPr>
+          <a:lstStyle/>
+          <a:p>
+            <a:r>
+              <a:rPr lang="en-US" altLang="zh-CN" sz="1400" b="1" dirty="0" smtClean="0"/>
+              <a:t>  6. </a:t>
+            </a:r>
+            <a:r>
+              <a:rPr lang="zh-CN" altLang="en-US" sz="1400" b="1" dirty="0" smtClean="0"/>
+              <a:t>访问</a:t>
+            </a:r>
+            <a:r>
+              <a:rPr lang="zh-CN" altLang="en-US" sz="1400" b="1" dirty="0"/>
+              <a:t>修饰符</a:t>
+            </a:r>
+            <a:r>
+              <a:rPr lang="en-US" altLang="zh-CN" sz="1400" b="1" dirty="0"/>
+              <a:t>public</a:t>
+            </a:r>
+            <a:r>
+              <a:rPr lang="zh-CN" altLang="en-US" sz="1400" b="1" dirty="0"/>
+              <a:t>、</a:t>
+            </a:r>
+            <a:r>
+              <a:rPr lang="en-US" altLang="zh-CN" sz="1400" b="1" dirty="0"/>
+              <a:t>private</a:t>
+            </a:r>
+            <a:r>
+              <a:rPr lang="zh-CN" altLang="en-US" sz="1400" b="1" dirty="0"/>
+              <a:t>、</a:t>
+            </a:r>
+            <a:r>
+              <a:rPr lang="en-US" altLang="zh-CN" sz="1400" b="1" dirty="0"/>
+              <a:t>protected</a:t>
+            </a:r>
+            <a:r>
+              <a:rPr lang="zh-CN" altLang="en-US" sz="1400" b="1" dirty="0"/>
+              <a:t>、以及不写（默认）时的区别</a:t>
+            </a:r>
+            <a:r>
+              <a:rPr lang="zh-CN" altLang="en-US" sz="1400" b="1" dirty="0" smtClean="0"/>
+              <a:t>？</a:t>
+            </a:r>
+            <a:endParaRPr lang="en-US" altLang="zh-CN" sz="1400" b="1" dirty="0" smtClean="0"/>
+          </a:p>
+          <a:p>
+            <a:r>
+              <a:rPr lang="en-US" altLang="zh-CN" sz="1000" dirty="0" smtClean="0"/>
+              <a:t>        Java</a:t>
+            </a:r>
+            <a:r>
+              <a:rPr lang="zh-CN" altLang="en-US" sz="1000" dirty="0"/>
+              <a:t>中，可以使用访问控制符来保护对类、变量、方法和构造方法的访问。</a:t>
+            </a:r>
+            <a:r>
+              <a:rPr lang="en-US" altLang="zh-CN" sz="1000" dirty="0"/>
+              <a:t>Java </a:t>
+            </a:r>
+            <a:r>
+              <a:rPr lang="zh-CN" altLang="en-US" sz="1000" dirty="0"/>
+              <a:t>支持 </a:t>
+            </a:r>
+            <a:r>
+              <a:rPr lang="en-US" altLang="zh-CN" sz="1000" dirty="0"/>
+              <a:t>4 </a:t>
+            </a:r>
+            <a:r>
+              <a:rPr lang="zh-CN" altLang="en-US" sz="1000" dirty="0"/>
+              <a:t>种不同的访问权限</a:t>
+            </a:r>
+            <a:r>
+              <a:rPr lang="zh-CN" altLang="en-US" sz="1000" dirty="0" smtClean="0"/>
+              <a:t>。</a:t>
+            </a:r>
+            <a:endParaRPr lang="en-US" altLang="zh-CN" sz="1000" dirty="0" smtClean="0"/>
+          </a:p>
+          <a:p>
+            <a:r>
+              <a:rPr lang="en-US" altLang="zh-CN" sz="1000" dirty="0" smtClean="0"/>
+              <a:t>          (1)default </a:t>
+            </a:r>
+            <a:r>
+              <a:rPr lang="en-US" altLang="zh-CN" sz="1000" dirty="0"/>
+              <a:t>(</a:t>
+            </a:r>
+            <a:r>
+              <a:rPr lang="zh-CN" altLang="en-US" sz="1000" dirty="0"/>
+              <a:t>即默认，什么也不写）</a:t>
+            </a:r>
+            <a:r>
+              <a:rPr lang="en-US" altLang="zh-CN" sz="1000" dirty="0"/>
+              <a:t>: </a:t>
+            </a:r>
+            <a:r>
+              <a:rPr lang="zh-CN" altLang="en-US" sz="1000" dirty="0"/>
+              <a:t>在同一包内可见，不使用任何修饰符。使用对象：类、接口、变量、方法</a:t>
+            </a:r>
+            <a:r>
+              <a:rPr lang="zh-CN" altLang="en-US" sz="1000" dirty="0" smtClean="0"/>
+              <a:t>。</a:t>
+            </a:r>
+            <a:endParaRPr lang="en-US" altLang="zh-CN" sz="1000" dirty="0" smtClean="0"/>
+          </a:p>
+          <a:p>
+            <a:r>
+              <a:rPr lang="en-US" altLang="zh-CN" sz="1000" dirty="0" smtClean="0"/>
+              <a:t>          (2)private </a:t>
+            </a:r>
+            <a:r>
+              <a:rPr lang="en-US" altLang="zh-CN" sz="1000" dirty="0"/>
+              <a:t>: </a:t>
+            </a:r>
+            <a:r>
+              <a:rPr lang="zh-CN" altLang="en-US" sz="1000" dirty="0"/>
+              <a:t>在同一类内可见。使用对象：变量、方法。 注意：不能修饰类（外部类</a:t>
+            </a:r>
+            <a:r>
+              <a:rPr lang="zh-CN" altLang="en-US" sz="1000" dirty="0" smtClean="0"/>
+              <a:t>）</a:t>
+            </a:r>
+            <a:endParaRPr lang="en-US" altLang="zh-CN" sz="1000" dirty="0" smtClean="0"/>
+          </a:p>
+          <a:p>
+            <a:r>
+              <a:rPr lang="en-US" altLang="zh-CN" sz="1000" dirty="0" smtClean="0"/>
+              <a:t>          (3)public </a:t>
+            </a:r>
+            <a:r>
+              <a:rPr lang="en-US" altLang="zh-CN" sz="1000" dirty="0"/>
+              <a:t>: </a:t>
+            </a:r>
+            <a:r>
+              <a:rPr lang="zh-CN" altLang="en-US" sz="1000" dirty="0"/>
+              <a:t>对所有类可见。使用对象：类、接口、变量、</a:t>
+            </a:r>
+            <a:r>
+              <a:rPr lang="zh-CN" altLang="en-US" sz="1000" dirty="0" smtClean="0"/>
+              <a:t>方法</a:t>
+            </a:r>
+            <a:endParaRPr lang="en-US" altLang="zh-CN" sz="1000" dirty="0" smtClean="0"/>
+          </a:p>
+          <a:p>
+            <a:r>
+              <a:rPr lang="en-US" altLang="zh-CN" sz="1000" dirty="0" smtClean="0"/>
+              <a:t>         (4)protected </a:t>
+            </a:r>
+            <a:r>
+              <a:rPr lang="en-US" altLang="zh-CN" sz="1000" dirty="0"/>
+              <a:t>: </a:t>
+            </a:r>
+            <a:r>
+              <a:rPr lang="zh-CN" altLang="en-US" sz="1000" dirty="0"/>
+              <a:t>对同一包内的类和所有子类可见。使用对象：变量、方法。 注意：不能修饰类（外部类）</a:t>
+            </a:r>
+            <a:r>
+              <a:rPr lang="zh-CN" altLang="en-US" sz="1000" dirty="0" smtClean="0"/>
+              <a:t>。</a:t>
+            </a:r>
+            <a:endParaRPr lang="zh-CN" altLang="en-US" sz="1000" dirty="0"/>
+          </a:p>
+        </p:txBody>
+      </p:sp>
+      <p:pic>
+        <p:nvPicPr>
+          <p:cNvPr id="1028" name="Picture 4" descr="image-20210219173433142"/>
+          <p:cNvPicPr>
+            <a:picLocks noChangeAspect="1" noChangeArrowheads="1"/>
+          </p:cNvPicPr>
+          <p:nvPr/>
+        </p:nvPicPr>
+        <p:blipFill>
+          <a:blip r:embed="rId2">
+            <a:extLst>
+              <a:ext uri="{28A0092B-C50C-407E-A947-70E740481C1C}">
+                <a14:useLocalDpi xmlns:a14="http://schemas.microsoft.com/office/drawing/2010/main" val="0"/>
+              </a:ext>
+            </a:extLst>
+          </a:blip>
+          <a:srcRect/>
+          <a:stretch>
+            <a:fillRect/>
+          </a:stretch>
+        </p:blipFill>
+        <p:spPr bwMode="auto">
+          <a:xfrm>
+            <a:off x="457415" y="2410644"/>
+            <a:ext cx="9148224" cy="1637573"/>
+          </a:xfrm>
+          <a:prstGeom prst="rect">
+            <a:avLst/>
+          </a:prstGeom>
+          <a:noFill/>
+          <a:extLst>
+            <a:ext uri="{909E8E84-426E-40DD-AFC4-6F175D3DCCD1}">
+              <a14:hiddenFill xmlns:a14="http://schemas.microsoft.com/office/drawing/2010/main">
+                <a:solidFill>
+                  <a:srgbClr val="FFFFFF"/>
+                </a:solidFill>
+              </a14:hiddenFill>
+            </a:ext>
+          </a:extLst>
+        </p:spPr>
+      </p:pic>
+      <p:sp>
+        <p:nvSpPr>
+          <p:cNvPr id="10" name="文本框 9"/>
+          <p:cNvSpPr txBox="1"/>
+          <p:nvPr/>
+        </p:nvSpPr>
+        <p:spPr>
+          <a:xfrm>
+            <a:off x="275208" y="4358936"/>
+            <a:ext cx="11771171" cy="1792798"/>
+          </a:xfrm>
+          <a:prstGeom prst="rect">
+            <a:avLst/>
+          </a:prstGeom>
+          <a:noFill/>
+        </p:spPr>
+        <p:txBody>
+          <a:bodyPr wrap="none" rtlCol="0">
+            <a:spAutoFit/>
+          </a:bodyPr>
+          <a:lstStyle/>
+          <a:p>
+            <a:r>
+              <a:rPr lang="en-US" altLang="zh-CN" sz="1600" b="1" dirty="0" smtClean="0"/>
+              <a:t>7. final</a:t>
+            </a:r>
+            <a:r>
+              <a:rPr lang="zh-CN" altLang="en-US" sz="1600" b="1" dirty="0"/>
+              <a:t>、</a:t>
+            </a:r>
+            <a:r>
+              <a:rPr lang="en-US" altLang="zh-CN" sz="1600" b="1" dirty="0"/>
+              <a:t>finally</a:t>
+            </a:r>
+            <a:r>
+              <a:rPr lang="zh-CN" altLang="en-US" sz="1600" b="1" dirty="0"/>
+              <a:t>、</a:t>
+            </a:r>
+            <a:r>
+              <a:rPr lang="en-US" altLang="zh-CN" sz="1600" b="1" dirty="0"/>
+              <a:t>finalize</a:t>
+            </a:r>
+            <a:r>
+              <a:rPr lang="zh-CN" altLang="en-US" sz="1600" b="1" dirty="0"/>
+              <a:t>的区别？</a:t>
+            </a:r>
+            <a:r>
+              <a:rPr lang="en-US" altLang="zh-CN" sz="1600" b="1" dirty="0"/>
+              <a:t>final </a:t>
+            </a:r>
+            <a:r>
+              <a:rPr lang="zh-CN" altLang="en-US" sz="1600" b="1" dirty="0"/>
+              <a:t>用于修饰变量、方法和类</a:t>
+            </a:r>
+            <a:r>
+              <a:rPr lang="zh-CN" altLang="en-US" sz="1600" b="1" dirty="0" smtClean="0"/>
+              <a:t>。</a:t>
+            </a:r>
+            <a:endParaRPr lang="en-US" altLang="zh-CN" sz="1600" b="1" dirty="0" smtClean="0"/>
+          </a:p>
+          <a:p>
+            <a:r>
+              <a:rPr lang="en-US" altLang="zh-CN" sz="1050" dirty="0" smtClean="0"/>
+              <a:t>1. final </a:t>
+            </a:r>
+            <a:r>
+              <a:rPr lang="zh-CN" altLang="en-US" sz="1050" dirty="0"/>
+              <a:t>变量：被修饰的变量不可变，不可变分为引用不可变和对象不可变，</a:t>
+            </a:r>
+            <a:r>
+              <a:rPr lang="en-US" altLang="zh-CN" sz="1050" dirty="0"/>
+              <a:t>final </a:t>
+            </a:r>
+            <a:r>
+              <a:rPr lang="zh-CN" altLang="en-US" sz="1050" dirty="0"/>
+              <a:t>指的是引用不可变，</a:t>
+            </a:r>
+            <a:r>
+              <a:rPr lang="en-US" altLang="zh-CN" sz="1050" dirty="0"/>
+              <a:t>final </a:t>
+            </a:r>
+            <a:r>
+              <a:rPr lang="zh-CN" altLang="en-US" sz="1050" dirty="0"/>
+              <a:t>修饰的变量必须初始化，通常称被修饰的变量为常量</a:t>
+            </a:r>
+            <a:r>
+              <a:rPr lang="zh-CN" altLang="en-US" sz="1050" dirty="0" smtClean="0"/>
+              <a:t>。</a:t>
+            </a:r>
+            <a:endParaRPr lang="en-US" altLang="zh-CN" sz="1050" dirty="0" smtClean="0"/>
+          </a:p>
+          <a:p>
+            <a:r>
+              <a:rPr lang="en-US" altLang="zh-CN" sz="1050" dirty="0"/>
+              <a:t> </a:t>
+            </a:r>
+            <a:r>
+              <a:rPr lang="en-US" altLang="zh-CN" sz="1050" dirty="0" smtClean="0"/>
+              <a:t>   final </a:t>
+            </a:r>
+            <a:r>
+              <a:rPr lang="zh-CN" altLang="en-US" sz="1050" dirty="0"/>
+              <a:t>方法：被修饰的方法不允许任何子类重写，子类可以使用该方法</a:t>
+            </a:r>
+            <a:r>
+              <a:rPr lang="zh-CN" altLang="en-US" sz="1050" dirty="0" smtClean="0"/>
+              <a:t>。</a:t>
+            </a:r>
+            <a:endParaRPr lang="en-US" altLang="zh-CN" sz="1050" dirty="0" smtClean="0"/>
+          </a:p>
+          <a:p>
+            <a:r>
+              <a:rPr lang="en-US" altLang="zh-CN" sz="1050" dirty="0"/>
+              <a:t> </a:t>
+            </a:r>
+            <a:r>
+              <a:rPr lang="en-US" altLang="zh-CN" sz="1050" dirty="0" smtClean="0"/>
+              <a:t>   final </a:t>
+            </a:r>
+            <a:r>
+              <a:rPr lang="zh-CN" altLang="en-US" sz="1050" dirty="0"/>
+              <a:t>类：被修饰的类不能被继承，所有方法不能被重写</a:t>
+            </a:r>
+            <a:r>
+              <a:rPr lang="zh-CN" altLang="en-US" sz="1050" dirty="0" smtClean="0"/>
+              <a:t>。</a:t>
+            </a:r>
+            <a:endParaRPr lang="en-US" altLang="zh-CN" sz="1050" dirty="0" smtClean="0"/>
+          </a:p>
+          <a:p>
+            <a:r>
+              <a:rPr lang="en-US" altLang="zh-CN" sz="1050" dirty="0" smtClean="0"/>
+              <a:t>2.finally </a:t>
+            </a:r>
+            <a:r>
+              <a:rPr lang="zh-CN" altLang="en-US" sz="1050" dirty="0"/>
+              <a:t>作为异常处理的一部分，它只能在 </a:t>
+            </a:r>
+            <a:r>
+              <a:rPr lang="en-US" altLang="zh-CN" sz="1050" dirty="0"/>
+              <a:t>try/catch </a:t>
+            </a:r>
+            <a:r>
+              <a:rPr lang="zh-CN" altLang="en-US" sz="1050" dirty="0"/>
+              <a:t>语句中，并且附带一个语句块表示这段语句最终一定被执行（无论是否抛出异常），经常被用在需要释放资源的情况下，</a:t>
+            </a:r>
+            <a:r>
+              <a:rPr lang="en-US" altLang="zh-CN" sz="1050" dirty="0" err="1"/>
+              <a:t>System.exit</a:t>
+            </a:r>
+            <a:r>
+              <a:rPr lang="en-US" altLang="zh-CN" sz="1050" dirty="0"/>
+              <a:t> (0) </a:t>
+            </a:r>
+            <a:r>
+              <a:rPr lang="zh-CN" altLang="en-US" sz="1050" dirty="0"/>
+              <a:t>可以阻断 </a:t>
+            </a:r>
+            <a:endParaRPr lang="en-US" altLang="zh-CN" sz="1050" dirty="0" smtClean="0"/>
+          </a:p>
+          <a:p>
+            <a:r>
+              <a:rPr lang="en-US" altLang="zh-CN" sz="1050" smtClean="0"/>
+              <a:t>   finally </a:t>
+            </a:r>
+            <a:r>
+              <a:rPr lang="zh-CN" altLang="en-US" sz="1050" dirty="0"/>
+              <a:t>执行</a:t>
+            </a:r>
+            <a:r>
+              <a:rPr lang="zh-CN" altLang="en-US" sz="1050" dirty="0" smtClean="0"/>
+              <a:t>。</a:t>
+            </a:r>
+            <a:endParaRPr lang="en-US" altLang="zh-CN" sz="1050" dirty="0" smtClean="0"/>
+          </a:p>
+          <a:p>
+            <a:r>
+              <a:rPr lang="en-US" altLang="zh-CN" sz="1050" dirty="0" smtClean="0"/>
+              <a:t>3.finalize </a:t>
+            </a:r>
+            <a:r>
+              <a:rPr lang="zh-CN" altLang="en-US" sz="1050" dirty="0"/>
+              <a:t>是在 </a:t>
+            </a:r>
+            <a:r>
+              <a:rPr lang="en-US" altLang="zh-CN" sz="1050" dirty="0" err="1"/>
+              <a:t>java.lang.Object</a:t>
+            </a:r>
+            <a:r>
+              <a:rPr lang="en-US" altLang="zh-CN" sz="1050" dirty="0"/>
+              <a:t> </a:t>
+            </a:r>
+            <a:r>
+              <a:rPr lang="zh-CN" altLang="en-US" sz="1050" dirty="0"/>
+              <a:t>里定义的方法，也就是说每一个对象都有这么个方法，这个方法在 </a:t>
+            </a:r>
+            <a:r>
+              <a:rPr lang="en-US" altLang="zh-CN" sz="1050" dirty="0" err="1"/>
+              <a:t>gc</a:t>
+            </a:r>
+            <a:r>
+              <a:rPr lang="en-US" altLang="zh-CN" sz="1050" dirty="0"/>
+              <a:t> </a:t>
+            </a:r>
+            <a:r>
+              <a:rPr lang="zh-CN" altLang="en-US" sz="1050" dirty="0"/>
+              <a:t>启动，该对象被回收的时候被调用</a:t>
+            </a:r>
+            <a:r>
+              <a:rPr lang="zh-CN" altLang="en-US" sz="1050" dirty="0" smtClean="0"/>
+              <a:t>。</a:t>
+            </a:r>
+            <a:endParaRPr lang="en-US" altLang="zh-CN" sz="1050" dirty="0" smtClean="0"/>
+          </a:p>
+          <a:p>
+            <a:r>
+              <a:rPr lang="zh-CN" altLang="en-US" sz="1050" dirty="0" smtClean="0"/>
+              <a:t>一</a:t>
+            </a:r>
+            <a:r>
+              <a:rPr lang="zh-CN" altLang="en-US" sz="1050" dirty="0"/>
+              <a:t>个对象的 </a:t>
+            </a:r>
+            <a:r>
+              <a:rPr lang="en-US" altLang="zh-CN" sz="1050" dirty="0"/>
+              <a:t>finalize </a:t>
+            </a:r>
+            <a:r>
+              <a:rPr lang="zh-CN" altLang="en-US" sz="1050" dirty="0"/>
+              <a:t>方法只会被调用一次，</a:t>
+            </a:r>
+            <a:r>
+              <a:rPr lang="en-US" altLang="zh-CN" sz="1050" dirty="0"/>
+              <a:t>finalize </a:t>
+            </a:r>
+            <a:r>
+              <a:rPr lang="zh-CN" altLang="en-US" sz="1050" dirty="0"/>
+              <a:t>被调用</a:t>
+            </a:r>
+            <a:r>
+              <a:rPr lang="zh-CN" altLang="en-US" sz="1050" dirty="0" smtClean="0"/>
+              <a:t>不</a:t>
+            </a:r>
+            <a:endParaRPr lang="en-US" altLang="zh-CN" sz="1050" dirty="0" smtClean="0"/>
+          </a:p>
+          <a:p>
+            <a:r>
+              <a:rPr lang="zh-CN" altLang="en-US" sz="1050" dirty="0" smtClean="0"/>
+              <a:t>一定</a:t>
+            </a:r>
+            <a:r>
+              <a:rPr lang="zh-CN" altLang="en-US" sz="1050" dirty="0"/>
+              <a:t>会立即回收该对象，所以有可能调用 </a:t>
+            </a:r>
+            <a:r>
+              <a:rPr lang="en-US" altLang="zh-CN" sz="1050" dirty="0"/>
+              <a:t>finalize </a:t>
+            </a:r>
+            <a:r>
+              <a:rPr lang="zh-CN" altLang="en-US" sz="1050" dirty="0"/>
+              <a:t>后，该对象又不需要被回收了，然后到了真正要被回收的时候，因为前面调用过一次，所以不会再次调用 </a:t>
+            </a:r>
+            <a:r>
+              <a:rPr lang="en-US" altLang="zh-CN" sz="1050" dirty="0"/>
+              <a:t>finalize </a:t>
+            </a:r>
+            <a:r>
+              <a:rPr lang="zh-CN" altLang="en-US" sz="1050" dirty="0"/>
+              <a:t>了，进而产生问题</a:t>
+            </a:r>
+            <a:r>
+              <a:rPr lang="zh-CN" altLang="en-US" sz="1050" dirty="0" smtClean="0"/>
+              <a:t>，</a:t>
+            </a:r>
+            <a:endParaRPr lang="en-US" altLang="zh-CN" sz="1050" dirty="0" smtClean="0"/>
+          </a:p>
+          <a:p>
+            <a:r>
+              <a:rPr lang="zh-CN" altLang="en-US" sz="1050" dirty="0" smtClean="0"/>
+              <a:t>因此</a:t>
+            </a:r>
+            <a:r>
+              <a:rPr lang="zh-CN" altLang="en-US" sz="1050" dirty="0"/>
+              <a:t>不推荐使用 </a:t>
+            </a:r>
+            <a:r>
+              <a:rPr lang="en-US" altLang="zh-CN" sz="1050" dirty="0"/>
+              <a:t>finalize </a:t>
+            </a:r>
+            <a:r>
+              <a:rPr lang="zh-CN" altLang="en-US" sz="1050" dirty="0"/>
+              <a:t>方法</a:t>
+            </a:r>
+            <a:r>
+              <a:rPr lang="zh-CN" altLang="en-US" sz="1050" dirty="0" smtClean="0"/>
+              <a:t>。</a:t>
+            </a:r>
+            <a:endParaRPr lang="zh-CN" altLang="en-US" sz="1050" dirty="0"/>
+          </a:p>
+        </p:txBody>
+      </p:sp>
+    </p:spTree>
+    <p:extLst>
+      <p:ext uri="{BB962C8B-B14F-4D97-AF65-F5344CB8AC3E}">
+        <p14:creationId xmlns:p14="http://schemas.microsoft.com/office/powerpoint/2010/main" val="1834635974"/>
       </p:ext>
     </p:extLst>
   </p:cSld>

</xml_diff>

<commit_message>
Add the difference between "==" and "equals"
</commit_message>
<xml_diff>
--- a/JavaInterview/Java_interview.pptx
+++ b/JavaInterview/Java_interview.pptx
@@ -11,6 +11,7 @@
     <p:sldId id="259" r:id="rId5"/>
     <p:sldId id="260" r:id="rId6"/>
     <p:sldId id="261" r:id="rId7"/>
+    <p:sldId id="262" r:id="rId8"/>
   </p:sldIdLst>
   <p:sldSz cx="12192000" cy="6858000"/>
   <p:notesSz cx="6858000" cy="9144000"/>
@@ -264,7 +265,7 @@
           <a:p>
             <a:fld id="{39790004-AB0F-4813-8C83-9BB57BC55FB1}" type="datetimeFigureOut">
               <a:rPr lang="zh-TW" altLang="en-US" smtClean="0"/>
-              <a:t>2023/11/9</a:t>
+              <a:t>2023/11/20</a:t>
             </a:fld>
             <a:endParaRPr lang="zh-TW" altLang="en-US"/>
           </a:p>
@@ -462,7 +463,7 @@
           <a:p>
             <a:fld id="{39790004-AB0F-4813-8C83-9BB57BC55FB1}" type="datetimeFigureOut">
               <a:rPr lang="zh-TW" altLang="en-US" smtClean="0"/>
-              <a:t>2023/11/9</a:t>
+              <a:t>2023/11/20</a:t>
             </a:fld>
             <a:endParaRPr lang="zh-TW" altLang="en-US"/>
           </a:p>
@@ -670,7 +671,7 @@
           <a:p>
             <a:fld id="{39790004-AB0F-4813-8C83-9BB57BC55FB1}" type="datetimeFigureOut">
               <a:rPr lang="zh-TW" altLang="en-US" smtClean="0"/>
-              <a:t>2023/11/9</a:t>
+              <a:t>2023/11/20</a:t>
             </a:fld>
             <a:endParaRPr lang="zh-TW" altLang="en-US"/>
           </a:p>
@@ -868,7 +869,7 @@
           <a:p>
             <a:fld id="{39790004-AB0F-4813-8C83-9BB57BC55FB1}" type="datetimeFigureOut">
               <a:rPr lang="zh-TW" altLang="en-US" smtClean="0"/>
-              <a:t>2023/11/9</a:t>
+              <a:t>2023/11/20</a:t>
             </a:fld>
             <a:endParaRPr lang="zh-TW" altLang="en-US"/>
           </a:p>
@@ -1143,7 +1144,7 @@
           <a:p>
             <a:fld id="{39790004-AB0F-4813-8C83-9BB57BC55FB1}" type="datetimeFigureOut">
               <a:rPr lang="zh-TW" altLang="en-US" smtClean="0"/>
-              <a:t>2023/11/9</a:t>
+              <a:t>2023/11/20</a:t>
             </a:fld>
             <a:endParaRPr lang="zh-TW" altLang="en-US"/>
           </a:p>
@@ -1408,7 +1409,7 @@
           <a:p>
             <a:fld id="{39790004-AB0F-4813-8C83-9BB57BC55FB1}" type="datetimeFigureOut">
               <a:rPr lang="zh-TW" altLang="en-US" smtClean="0"/>
-              <a:t>2023/11/9</a:t>
+              <a:t>2023/11/20</a:t>
             </a:fld>
             <a:endParaRPr lang="zh-TW" altLang="en-US"/>
           </a:p>
@@ -1820,7 +1821,7 @@
           <a:p>
             <a:fld id="{39790004-AB0F-4813-8C83-9BB57BC55FB1}" type="datetimeFigureOut">
               <a:rPr lang="zh-TW" altLang="en-US" smtClean="0"/>
-              <a:t>2023/11/9</a:t>
+              <a:t>2023/11/20</a:t>
             </a:fld>
             <a:endParaRPr lang="zh-TW" altLang="en-US"/>
           </a:p>
@@ -1961,7 +1962,7 @@
           <a:p>
             <a:fld id="{39790004-AB0F-4813-8C83-9BB57BC55FB1}" type="datetimeFigureOut">
               <a:rPr lang="zh-TW" altLang="en-US" smtClean="0"/>
-              <a:t>2023/11/9</a:t>
+              <a:t>2023/11/20</a:t>
             </a:fld>
             <a:endParaRPr lang="zh-TW" altLang="en-US"/>
           </a:p>
@@ -2074,7 +2075,7 @@
           <a:p>
             <a:fld id="{39790004-AB0F-4813-8C83-9BB57BC55FB1}" type="datetimeFigureOut">
               <a:rPr lang="zh-TW" altLang="en-US" smtClean="0"/>
-              <a:t>2023/11/9</a:t>
+              <a:t>2023/11/20</a:t>
             </a:fld>
             <a:endParaRPr lang="zh-TW" altLang="en-US"/>
           </a:p>
@@ -2385,7 +2386,7 @@
           <a:p>
             <a:fld id="{39790004-AB0F-4813-8C83-9BB57BC55FB1}" type="datetimeFigureOut">
               <a:rPr lang="zh-TW" altLang="en-US" smtClean="0"/>
-              <a:t>2023/11/9</a:t>
+              <a:t>2023/11/20</a:t>
             </a:fld>
             <a:endParaRPr lang="zh-TW" altLang="en-US"/>
           </a:p>
@@ -2673,7 +2674,7 @@
           <a:p>
             <a:fld id="{39790004-AB0F-4813-8C83-9BB57BC55FB1}" type="datetimeFigureOut">
               <a:rPr lang="zh-TW" altLang="en-US" smtClean="0"/>
-              <a:t>2023/11/9</a:t>
+              <a:t>2023/11/20</a:t>
             </a:fld>
             <a:endParaRPr lang="zh-TW" altLang="en-US"/>
           </a:p>
@@ -2914,7 +2915,7 @@
           <a:p>
             <a:fld id="{39790004-AB0F-4813-8C83-9BB57BC55FB1}" type="datetimeFigureOut">
               <a:rPr lang="zh-TW" altLang="en-US" smtClean="0"/>
-              <a:t>2023/11/9</a:t>
+              <a:t>2023/11/20</a:t>
             </a:fld>
             <a:endParaRPr lang="zh-TW" altLang="en-US"/>
           </a:p>
@@ -4087,11 +4088,7 @@
             </a:r>
             <a:r>
               <a:rPr lang="zh-CN" altLang="en-US" b="1" dirty="0" smtClean="0"/>
-              <a:t>基本</a:t>
-            </a:r>
-            <a:r>
-              <a:rPr lang="zh-CN" altLang="en-US" b="1" dirty="0" smtClean="0"/>
-              <a:t>数据类型</a:t>
+              <a:t>基本数据类型</a:t>
             </a:r>
             <a:endParaRPr lang="zh-CN" altLang="en-US" b="1" dirty="0"/>
           </a:p>
@@ -4935,6 +4932,302 @@
     <p:extLst>
       <p:ext uri="{BB962C8B-B14F-4D97-AF65-F5344CB8AC3E}">
         <p14:creationId xmlns:p14="http://schemas.microsoft.com/office/powerpoint/2010/main" val="1834635974"/>
+      </p:ext>
+    </p:extLst>
+  </p:cSld>
+  <p:clrMapOvr>
+    <a:masterClrMapping/>
+  </p:clrMapOvr>
+</p:sld>
+</file>
+
+<file path=ppt/slides/slide7.xml><?xml version="1.0" encoding="utf-8"?>
+<p:sld xmlns:a="http://schemas.openxmlformats.org/drawingml/2006/main" xmlns:r="http://schemas.openxmlformats.org/officeDocument/2006/relationships" xmlns:p="http://schemas.openxmlformats.org/presentationml/2006/main">
+  <p:cSld>
+    <p:spTree>
+      <p:nvGrpSpPr>
+        <p:cNvPr id="1" name=""/>
+        <p:cNvGrpSpPr/>
+        <p:nvPr/>
+      </p:nvGrpSpPr>
+      <p:grpSpPr>
+        <a:xfrm>
+          <a:off x="0" y="0"/>
+          <a:ext cx="0" cy="0"/>
+          <a:chOff x="0" y="0"/>
+          <a:chExt cx="0" cy="0"/>
+        </a:xfrm>
+      </p:grpSpPr>
+      <p:sp>
+        <p:nvSpPr>
+          <p:cNvPr id="5" name="文本框 4"/>
+          <p:cNvSpPr txBox="1"/>
+          <p:nvPr/>
+        </p:nvSpPr>
+        <p:spPr>
+          <a:xfrm>
+            <a:off x="346227" y="275208"/>
+            <a:ext cx="11354541" cy="2308324"/>
+          </a:xfrm>
+          <a:prstGeom prst="rect">
+            <a:avLst/>
+          </a:prstGeom>
+          <a:noFill/>
+        </p:spPr>
+        <p:txBody>
+          <a:bodyPr wrap="square" rtlCol="0">
+            <a:spAutoFit/>
+          </a:bodyPr>
+          <a:lstStyle/>
+          <a:p>
+            <a:pPr marL="342900" indent="-342900">
+              <a:buAutoNum type="arabicPeriod" startAt="6"/>
+            </a:pPr>
+            <a:r>
+              <a:rPr lang="en-US" altLang="zh-CN" sz="1400" b="1" dirty="0" smtClean="0"/>
+              <a:t>== </a:t>
+            </a:r>
+            <a:r>
+              <a:rPr lang="zh-CN" altLang="en-US" sz="1400" b="1" dirty="0" smtClean="0"/>
+              <a:t>和 </a:t>
+            </a:r>
+            <a:r>
+              <a:rPr lang="en-US" altLang="zh-CN" sz="1400" b="1" dirty="0" smtClean="0"/>
+              <a:t>equals </a:t>
+            </a:r>
+            <a:r>
+              <a:rPr lang="zh-CN" altLang="en-US" sz="1400" b="1" dirty="0" smtClean="0"/>
+              <a:t>区别</a:t>
+            </a:r>
+            <a:endParaRPr lang="en-US" altLang="zh-CN" sz="1400" b="1" dirty="0" smtClean="0"/>
+          </a:p>
+          <a:p>
+            <a:r>
+              <a:rPr lang="zh-CN" altLang="en-US" sz="1400" b="1" dirty="0" smtClean="0"/>
+              <a:t>                 </a:t>
+            </a:r>
+            <a:r>
+              <a:rPr lang="zh-CN" altLang="en-US" sz="1400" dirty="0" smtClean="0"/>
+              <a:t>如果</a:t>
+            </a:r>
+            <a:r>
+              <a:rPr lang="en-US" altLang="zh-CN" sz="1400" dirty="0"/>
+              <a:t>==</a:t>
+            </a:r>
+            <a:r>
+              <a:rPr lang="zh-CN" altLang="en-US" sz="1400" dirty="0"/>
+              <a:t>比较的是基本数据类型，那么比较的是两个基本数据类型的值是否相等</a:t>
+            </a:r>
+            <a:r>
+              <a:rPr lang="zh-CN" altLang="en-US" sz="1400" dirty="0" smtClean="0"/>
+              <a:t>；</a:t>
+            </a:r>
+            <a:endParaRPr lang="en-US" altLang="zh-CN" sz="1400" dirty="0" smtClean="0"/>
+          </a:p>
+          <a:p>
+            <a:r>
+              <a:rPr lang="en-US" altLang="zh-CN" sz="1400" dirty="0"/>
+              <a:t> </a:t>
+            </a:r>
+            <a:r>
+              <a:rPr lang="en-US" altLang="zh-CN" sz="1400" dirty="0" smtClean="0"/>
+              <a:t>                </a:t>
+            </a:r>
+            <a:r>
+              <a:rPr lang="zh-CN" altLang="en-US" sz="1400" dirty="0" smtClean="0"/>
+              <a:t>如果</a:t>
+            </a:r>
+            <a:r>
+              <a:rPr lang="en-US" altLang="zh-CN" sz="1400" dirty="0"/>
+              <a:t>==</a:t>
+            </a:r>
+            <a:r>
+              <a:rPr lang="zh-CN" altLang="en-US" sz="1400" dirty="0"/>
+              <a:t>是比较的两个对象，那么比较的是两个对象的引用，也就是判断两个对象是否指向了同一块内存</a:t>
+            </a:r>
+            <a:r>
+              <a:rPr lang="zh-CN" altLang="en-US" sz="1400" dirty="0" smtClean="0"/>
+              <a:t>区域</a:t>
+            </a:r>
+            <a:endParaRPr lang="en-US" altLang="zh-CN" sz="1400" dirty="0" smtClean="0"/>
+          </a:p>
+          <a:p>
+            <a:endParaRPr lang="en-US" altLang="zh-CN" sz="1400" dirty="0"/>
+          </a:p>
+          <a:p>
+            <a:r>
+              <a:rPr lang="en-US" altLang="zh-CN" sz="1400" dirty="0" smtClean="0"/>
+              <a:t>                 equals</a:t>
+            </a:r>
+            <a:r>
+              <a:rPr lang="zh-CN" altLang="en-US" sz="1400" dirty="0" smtClean="0"/>
+              <a:t>它</a:t>
+            </a:r>
+            <a:r>
+              <a:rPr lang="zh-CN" altLang="en-US" sz="1400" dirty="0"/>
+              <a:t>的作用也是判断两个对象是否相等，般有两种使用情况</a:t>
+            </a:r>
+            <a:r>
+              <a:rPr lang="zh-CN" altLang="en-US" sz="1400" dirty="0" smtClean="0"/>
+              <a:t>：</a:t>
+            </a:r>
+            <a:endParaRPr lang="en-US" altLang="zh-CN" sz="1400" dirty="0" smtClean="0"/>
+          </a:p>
+          <a:p>
+            <a:r>
+              <a:rPr lang="en-US" altLang="zh-CN" sz="1400" dirty="0"/>
+              <a:t> </a:t>
+            </a:r>
+            <a:r>
+              <a:rPr lang="en-US" altLang="zh-CN" sz="1400" dirty="0" smtClean="0"/>
+              <a:t>                       </a:t>
+            </a:r>
+            <a:r>
+              <a:rPr lang="zh-CN" altLang="en-US" sz="1400" dirty="0" smtClean="0"/>
+              <a:t>情况</a:t>
+            </a:r>
+            <a:r>
+              <a:rPr lang="en-US" altLang="zh-CN" sz="1400" dirty="0"/>
+              <a:t>1</a:t>
+            </a:r>
+            <a:r>
+              <a:rPr lang="zh-CN" altLang="en-US" sz="1400" dirty="0"/>
+              <a:t>，类没有覆盖</a:t>
+            </a:r>
+            <a:r>
+              <a:rPr lang="en-US" altLang="zh-CN" sz="1400" dirty="0"/>
+              <a:t>equals()</a:t>
+            </a:r>
+            <a:r>
+              <a:rPr lang="zh-CN" altLang="en-US" sz="1400" dirty="0"/>
+              <a:t>方法。则通过</a:t>
+            </a:r>
+            <a:r>
+              <a:rPr lang="en-US" altLang="zh-CN" sz="1400" dirty="0"/>
+              <a:t>equals()</a:t>
+            </a:r>
+            <a:r>
+              <a:rPr lang="zh-CN" altLang="en-US" sz="1400" dirty="0"/>
+              <a:t>比较该类的两个</a:t>
+            </a:r>
+            <a:r>
+              <a:rPr lang="zh-CN" altLang="en-US" sz="1400" dirty="0" smtClean="0"/>
+              <a:t>对象    </a:t>
+            </a:r>
+            <a:endParaRPr lang="en-US" altLang="zh-CN" sz="1400" dirty="0" smtClean="0"/>
+          </a:p>
+          <a:p>
+            <a:r>
+              <a:rPr lang="en-US" altLang="zh-CN" sz="1400" dirty="0" smtClean="0"/>
+              <a:t>                                        </a:t>
+            </a:r>
+            <a:r>
+              <a:rPr lang="zh-CN" altLang="en-US" sz="1400" dirty="0" smtClean="0"/>
+              <a:t>时</a:t>
+            </a:r>
+            <a:r>
+              <a:rPr lang="zh-CN" altLang="en-US" sz="1400" dirty="0"/>
+              <a:t>，等价于通过“</a:t>
+            </a:r>
+            <a:r>
+              <a:rPr lang="en-US" altLang="zh-CN" sz="1400" dirty="0"/>
+              <a:t>==”</a:t>
+            </a:r>
+            <a:r>
+              <a:rPr lang="zh-CN" altLang="en-US" sz="1400" dirty="0"/>
+              <a:t>比较这两个对象</a:t>
+            </a:r>
+            <a:r>
+              <a:rPr lang="zh-CN" altLang="en-US" sz="1400" dirty="0" smtClean="0"/>
+              <a:t>。</a:t>
+            </a:r>
+            <a:endParaRPr lang="en-US" altLang="zh-CN" sz="1400" dirty="0" smtClean="0"/>
+          </a:p>
+          <a:p>
+            <a:r>
+              <a:rPr lang="en-US" altLang="zh-CN" sz="1400" dirty="0"/>
+              <a:t> </a:t>
+            </a:r>
+            <a:r>
+              <a:rPr lang="en-US" altLang="zh-CN" sz="1400" dirty="0" smtClean="0"/>
+              <a:t>                       </a:t>
+            </a:r>
+            <a:r>
+              <a:rPr lang="zh-CN" altLang="en-US" sz="1400" dirty="0" smtClean="0"/>
+              <a:t>情况</a:t>
+            </a:r>
+            <a:r>
+              <a:rPr lang="en-US" altLang="zh-CN" sz="1400" dirty="0"/>
+              <a:t>2</a:t>
+            </a:r>
+            <a:r>
+              <a:rPr lang="zh-CN" altLang="en-US" sz="1400" dirty="0"/>
+              <a:t>，类覆盖了</a:t>
+            </a:r>
+            <a:r>
+              <a:rPr lang="en-US" altLang="zh-CN" sz="1400" dirty="0"/>
+              <a:t>equals()</a:t>
+            </a:r>
+            <a:r>
+              <a:rPr lang="zh-CN" altLang="en-US" sz="1400" dirty="0"/>
+              <a:t>方法。一般，我们都覆盖</a:t>
+            </a:r>
+            <a:r>
+              <a:rPr lang="en-US" altLang="zh-CN" sz="1400" dirty="0"/>
+              <a:t>equals()</a:t>
+            </a:r>
+            <a:r>
+              <a:rPr lang="zh-CN" altLang="en-US" sz="1400" dirty="0"/>
+              <a:t>方法来两个对象的内容相等；若它们的内容相等，则返回</a:t>
+            </a:r>
+            <a:r>
+              <a:rPr lang="en-US" altLang="zh-CN" sz="1400" dirty="0"/>
+              <a:t>true(</a:t>
+            </a:r>
+            <a:r>
+              <a:rPr lang="zh-CN" altLang="en-US" sz="1400" dirty="0"/>
+              <a:t>即，认为</a:t>
+            </a:r>
+            <a:r>
+              <a:rPr lang="zh-CN" altLang="en-US" sz="1400" dirty="0" smtClean="0"/>
+              <a:t>这</a:t>
+            </a:r>
+            <a:endParaRPr lang="en-US" altLang="zh-CN" sz="1400" dirty="0" smtClean="0"/>
+          </a:p>
+          <a:p>
+            <a:r>
+              <a:rPr lang="en-US" altLang="zh-CN" sz="1400" dirty="0" smtClean="0"/>
+              <a:t>                                       </a:t>
+            </a:r>
+            <a:r>
+              <a:rPr lang="zh-CN" altLang="en-US" sz="1400" dirty="0" smtClean="0"/>
+              <a:t>两</a:t>
+            </a:r>
+            <a:r>
+              <a:rPr lang="zh-CN" altLang="en-US" sz="1400" dirty="0"/>
+              <a:t>个对象相等</a:t>
+            </a:r>
+            <a:r>
+              <a:rPr lang="en-US" altLang="zh-CN" sz="1400" dirty="0"/>
+              <a:t>)</a:t>
+            </a:r>
+            <a:r>
+              <a:rPr lang="zh-CN" altLang="en-US" sz="1400" dirty="0"/>
+              <a:t>。</a:t>
+            </a:r>
+          </a:p>
+          <a:p>
+            <a:pPr marL="342900" indent="-342900">
+              <a:buAutoNum type="arabicPeriod" startAt="6"/>
+            </a:pPr>
+            <a:endParaRPr lang="en-US" altLang="zh-CN" dirty="0"/>
+          </a:p>
+        </p:txBody>
+      </p:sp>
+    </p:spTree>
+    <p:extLst>
+      <p:ext uri="{BB962C8B-B14F-4D97-AF65-F5344CB8AC3E}">
+        <p14:creationId xmlns:p14="http://schemas.microsoft.com/office/powerpoint/2010/main" val="3523387501"/>
       </p:ext>
     </p:extLst>
   </p:cSld>

</xml_diff>